<commit_message>
updated slide and correct typo
</commit_message>
<xml_diff>
--- a/backup/Standardized Test Analysis.pptx
+++ b/backup/Standardized Test Analysis.pptx
@@ -4,6 +4,9 @@
   <p:sldMasterIdLst>
     <p:sldMasterId id="2147483673" r:id="rId1"/>
   </p:sldMasterIdLst>
+  <p:notesMasterIdLst>
+    <p:notesMasterId r:id="rId9"/>
+  </p:notesMasterIdLst>
   <p:sldIdLst>
     <p:sldId id="256" r:id="rId2"/>
     <p:sldId id="257" r:id="rId3"/>
@@ -116,6 +119,447 @@
     </p:ext>
   </p:extLst>
 </p:presentation>
+</file>
+
+<file path=ppt/notesMasters/notesMaster1.xml><?xml version="1.0" encoding="utf-8"?>
+<p:notesMaster xmlns:a="http://schemas.openxmlformats.org/drawingml/2006/main" xmlns:r="http://schemas.openxmlformats.org/officeDocument/2006/relationships" xmlns:p="http://schemas.openxmlformats.org/presentationml/2006/main">
+  <p:cSld>
+    <p:bg>
+      <p:bgRef idx="1001">
+        <a:schemeClr val="bg1"/>
+      </p:bgRef>
+    </p:bg>
+    <p:spTree>
+      <p:nvGrpSpPr>
+        <p:cNvPr id="1" name=""/>
+        <p:cNvGrpSpPr/>
+        <p:nvPr/>
+      </p:nvGrpSpPr>
+      <p:grpSpPr>
+        <a:xfrm>
+          <a:off x="0" y="0"/>
+          <a:ext cx="0" cy="0"/>
+          <a:chOff x="0" y="0"/>
+          <a:chExt cx="0" cy="0"/>
+        </a:xfrm>
+      </p:grpSpPr>
+      <p:sp>
+        <p:nvSpPr>
+          <p:cNvPr id="2" name="Header Placeholder 1"/>
+          <p:cNvSpPr>
+            <a:spLocks noGrp="1"/>
+          </p:cNvSpPr>
+          <p:nvPr>
+            <p:ph type="hdr" sz="quarter"/>
+          </p:nvPr>
+        </p:nvSpPr>
+        <p:spPr>
+          <a:xfrm>
+            <a:off x="0" y="0"/>
+            <a:ext cx="2971800" cy="458788"/>
+          </a:xfrm>
+          <a:prstGeom prst="rect">
+            <a:avLst/>
+          </a:prstGeom>
+        </p:spPr>
+        <p:txBody>
+          <a:bodyPr vert="horz" lIns="91440" tIns="45720" rIns="91440" bIns="45720" rtlCol="0"/>
+          <a:lstStyle>
+            <a:lvl1pPr algn="l">
+              <a:defRPr sz="1200"/>
+            </a:lvl1pPr>
+          </a:lstStyle>
+          <a:p>
+            <a:endParaRPr lang="en-AE"/>
+          </a:p>
+        </p:txBody>
+      </p:sp>
+      <p:sp>
+        <p:nvSpPr>
+          <p:cNvPr id="3" name="Date Placeholder 2"/>
+          <p:cNvSpPr>
+            <a:spLocks noGrp="1"/>
+          </p:cNvSpPr>
+          <p:nvPr>
+            <p:ph type="dt" idx="1"/>
+          </p:nvPr>
+        </p:nvSpPr>
+        <p:spPr>
+          <a:xfrm>
+            <a:off x="3884613" y="0"/>
+            <a:ext cx="2971800" cy="458788"/>
+          </a:xfrm>
+          <a:prstGeom prst="rect">
+            <a:avLst/>
+          </a:prstGeom>
+        </p:spPr>
+        <p:txBody>
+          <a:bodyPr vert="horz" lIns="91440" tIns="45720" rIns="91440" bIns="45720" rtlCol="0"/>
+          <a:lstStyle>
+            <a:lvl1pPr algn="r">
+              <a:defRPr sz="1200"/>
+            </a:lvl1pPr>
+          </a:lstStyle>
+          <a:p>
+            <a:fld id="{8ED59AAE-0153-44D4-8445-1369D1D53A15}" type="datetimeFigureOut">
+              <a:rPr lang="en-AE" smtClean="0"/>
+              <a:t>11/10/2024</a:t>
+            </a:fld>
+            <a:endParaRPr lang="en-AE"/>
+          </a:p>
+        </p:txBody>
+      </p:sp>
+      <p:sp>
+        <p:nvSpPr>
+          <p:cNvPr id="4" name="Slide Image Placeholder 3"/>
+          <p:cNvSpPr>
+            <a:spLocks noGrp="1" noRot="1" noChangeAspect="1"/>
+          </p:cNvSpPr>
+          <p:nvPr>
+            <p:ph type="sldImg" idx="2"/>
+          </p:nvPr>
+        </p:nvSpPr>
+        <p:spPr>
+          <a:xfrm>
+            <a:off x="685800" y="1143000"/>
+            <a:ext cx="5486400" cy="3086100"/>
+          </a:xfrm>
+          <a:prstGeom prst="rect">
+            <a:avLst/>
+          </a:prstGeom>
+          <a:noFill/>
+          <a:ln w="12700">
+            <a:solidFill>
+              <a:prstClr val="black"/>
+            </a:solidFill>
+          </a:ln>
+        </p:spPr>
+        <p:txBody>
+          <a:bodyPr vert="horz" lIns="91440" tIns="45720" rIns="91440" bIns="45720" rtlCol="0" anchor="ctr"/>
+          <a:lstStyle/>
+          <a:p>
+            <a:endParaRPr lang="en-AE"/>
+          </a:p>
+        </p:txBody>
+      </p:sp>
+      <p:sp>
+        <p:nvSpPr>
+          <p:cNvPr id="5" name="Notes Placeholder 4"/>
+          <p:cNvSpPr>
+            <a:spLocks noGrp="1"/>
+          </p:cNvSpPr>
+          <p:nvPr>
+            <p:ph type="body" sz="quarter" idx="3"/>
+          </p:nvPr>
+        </p:nvSpPr>
+        <p:spPr>
+          <a:xfrm>
+            <a:off x="685800" y="4400550"/>
+            <a:ext cx="5486400" cy="3600450"/>
+          </a:xfrm>
+          <a:prstGeom prst="rect">
+            <a:avLst/>
+          </a:prstGeom>
+        </p:spPr>
+        <p:txBody>
+          <a:bodyPr vert="horz" lIns="91440" tIns="45720" rIns="91440" bIns="45720" rtlCol="0"/>
+          <a:lstStyle/>
+          <a:p>
+            <a:pPr lvl="0"/>
+            <a:r>
+              <a:rPr lang="en-US"/>
+              <a:t>Click to edit Master text styles</a:t>
+            </a:r>
+          </a:p>
+          <a:p>
+            <a:pPr lvl="1"/>
+            <a:r>
+              <a:rPr lang="en-US"/>
+              <a:t>Second level</a:t>
+            </a:r>
+          </a:p>
+          <a:p>
+            <a:pPr lvl="2"/>
+            <a:r>
+              <a:rPr lang="en-US"/>
+              <a:t>Third level</a:t>
+            </a:r>
+          </a:p>
+          <a:p>
+            <a:pPr lvl="3"/>
+            <a:r>
+              <a:rPr lang="en-US"/>
+              <a:t>Fourth level</a:t>
+            </a:r>
+          </a:p>
+          <a:p>
+            <a:pPr lvl="4"/>
+            <a:r>
+              <a:rPr lang="en-US"/>
+              <a:t>Fifth level</a:t>
+            </a:r>
+            <a:endParaRPr lang="en-AE"/>
+          </a:p>
+        </p:txBody>
+      </p:sp>
+      <p:sp>
+        <p:nvSpPr>
+          <p:cNvPr id="6" name="Footer Placeholder 5"/>
+          <p:cNvSpPr>
+            <a:spLocks noGrp="1"/>
+          </p:cNvSpPr>
+          <p:nvPr>
+            <p:ph type="ftr" sz="quarter" idx="4"/>
+          </p:nvPr>
+        </p:nvSpPr>
+        <p:spPr>
+          <a:xfrm>
+            <a:off x="0" y="8685213"/>
+            <a:ext cx="2971800" cy="458787"/>
+          </a:xfrm>
+          <a:prstGeom prst="rect">
+            <a:avLst/>
+          </a:prstGeom>
+        </p:spPr>
+        <p:txBody>
+          <a:bodyPr vert="horz" lIns="91440" tIns="45720" rIns="91440" bIns="45720" rtlCol="0" anchor="b"/>
+          <a:lstStyle>
+            <a:lvl1pPr algn="l">
+              <a:defRPr sz="1200"/>
+            </a:lvl1pPr>
+          </a:lstStyle>
+          <a:p>
+            <a:endParaRPr lang="en-AE"/>
+          </a:p>
+        </p:txBody>
+      </p:sp>
+      <p:sp>
+        <p:nvSpPr>
+          <p:cNvPr id="7" name="Slide Number Placeholder 6"/>
+          <p:cNvSpPr>
+            <a:spLocks noGrp="1"/>
+          </p:cNvSpPr>
+          <p:nvPr>
+            <p:ph type="sldNum" sz="quarter" idx="5"/>
+          </p:nvPr>
+        </p:nvSpPr>
+        <p:spPr>
+          <a:xfrm>
+            <a:off x="3884613" y="8685213"/>
+            <a:ext cx="2971800" cy="458787"/>
+          </a:xfrm>
+          <a:prstGeom prst="rect">
+            <a:avLst/>
+          </a:prstGeom>
+        </p:spPr>
+        <p:txBody>
+          <a:bodyPr vert="horz" lIns="91440" tIns="45720" rIns="91440" bIns="45720" rtlCol="0" anchor="b"/>
+          <a:lstStyle>
+            <a:lvl1pPr algn="r">
+              <a:defRPr sz="1200"/>
+            </a:lvl1pPr>
+          </a:lstStyle>
+          <a:p>
+            <a:fld id="{7566C1FF-74EB-499E-BC09-3CB0C6C86336}" type="slidenum">
+              <a:rPr lang="en-AE" smtClean="0"/>
+              <a:t>‹#›</a:t>
+            </a:fld>
+            <a:endParaRPr lang="en-AE"/>
+          </a:p>
+        </p:txBody>
+      </p:sp>
+    </p:spTree>
+    <p:extLst>
+      <p:ext uri="{BB962C8B-B14F-4D97-AF65-F5344CB8AC3E}">
+        <p14:creationId xmlns:p14="http://schemas.microsoft.com/office/powerpoint/2010/main" val="1116450888"/>
+      </p:ext>
+    </p:extLst>
+  </p:cSld>
+  <p:clrMap bg1="lt1" tx1="dk1" bg2="lt2" tx2="dk2" accent1="accent1" accent2="accent2" accent3="accent3" accent4="accent4" accent5="accent5" accent6="accent6" hlink="hlink" folHlink="folHlink"/>
+  <p:notesStyle>
+    <a:lvl1pPr marL="0" algn="l" defTabSz="914400" rtl="0" eaLnBrk="1" latinLnBrk="0" hangingPunct="1">
+      <a:defRPr sz="1200" kern="1200">
+        <a:solidFill>
+          <a:schemeClr val="tx1"/>
+        </a:solidFill>
+        <a:latin typeface="+mn-lt"/>
+        <a:ea typeface="+mn-ea"/>
+        <a:cs typeface="+mn-cs"/>
+      </a:defRPr>
+    </a:lvl1pPr>
+    <a:lvl2pPr marL="457200" algn="l" defTabSz="914400" rtl="0" eaLnBrk="1" latinLnBrk="0" hangingPunct="1">
+      <a:defRPr sz="1200" kern="1200">
+        <a:solidFill>
+          <a:schemeClr val="tx1"/>
+        </a:solidFill>
+        <a:latin typeface="+mn-lt"/>
+        <a:ea typeface="+mn-ea"/>
+        <a:cs typeface="+mn-cs"/>
+      </a:defRPr>
+    </a:lvl2pPr>
+    <a:lvl3pPr marL="914400" algn="l" defTabSz="914400" rtl="0" eaLnBrk="1" latinLnBrk="0" hangingPunct="1">
+      <a:defRPr sz="1200" kern="1200">
+        <a:solidFill>
+          <a:schemeClr val="tx1"/>
+        </a:solidFill>
+        <a:latin typeface="+mn-lt"/>
+        <a:ea typeface="+mn-ea"/>
+        <a:cs typeface="+mn-cs"/>
+      </a:defRPr>
+    </a:lvl3pPr>
+    <a:lvl4pPr marL="1371600" algn="l" defTabSz="914400" rtl="0" eaLnBrk="1" latinLnBrk="0" hangingPunct="1">
+      <a:defRPr sz="1200" kern="1200">
+        <a:solidFill>
+          <a:schemeClr val="tx1"/>
+        </a:solidFill>
+        <a:latin typeface="+mn-lt"/>
+        <a:ea typeface="+mn-ea"/>
+        <a:cs typeface="+mn-cs"/>
+      </a:defRPr>
+    </a:lvl4pPr>
+    <a:lvl5pPr marL="1828800" algn="l" defTabSz="914400" rtl="0" eaLnBrk="1" latinLnBrk="0" hangingPunct="1">
+      <a:defRPr sz="1200" kern="1200">
+        <a:solidFill>
+          <a:schemeClr val="tx1"/>
+        </a:solidFill>
+        <a:latin typeface="+mn-lt"/>
+        <a:ea typeface="+mn-ea"/>
+        <a:cs typeface="+mn-cs"/>
+      </a:defRPr>
+    </a:lvl5pPr>
+    <a:lvl6pPr marL="2286000" algn="l" defTabSz="914400" rtl="0" eaLnBrk="1" latinLnBrk="0" hangingPunct="1">
+      <a:defRPr sz="1200" kern="1200">
+        <a:solidFill>
+          <a:schemeClr val="tx1"/>
+        </a:solidFill>
+        <a:latin typeface="+mn-lt"/>
+        <a:ea typeface="+mn-ea"/>
+        <a:cs typeface="+mn-cs"/>
+      </a:defRPr>
+    </a:lvl6pPr>
+    <a:lvl7pPr marL="2743200" algn="l" defTabSz="914400" rtl="0" eaLnBrk="1" latinLnBrk="0" hangingPunct="1">
+      <a:defRPr sz="1200" kern="1200">
+        <a:solidFill>
+          <a:schemeClr val="tx1"/>
+        </a:solidFill>
+        <a:latin typeface="+mn-lt"/>
+        <a:ea typeface="+mn-ea"/>
+        <a:cs typeface="+mn-cs"/>
+      </a:defRPr>
+    </a:lvl7pPr>
+    <a:lvl8pPr marL="3200400" algn="l" defTabSz="914400" rtl="0" eaLnBrk="1" latinLnBrk="0" hangingPunct="1">
+      <a:defRPr sz="1200" kern="1200">
+        <a:solidFill>
+          <a:schemeClr val="tx1"/>
+        </a:solidFill>
+        <a:latin typeface="+mn-lt"/>
+        <a:ea typeface="+mn-ea"/>
+        <a:cs typeface="+mn-cs"/>
+      </a:defRPr>
+    </a:lvl8pPr>
+    <a:lvl9pPr marL="3657600" algn="l" defTabSz="914400" rtl="0" eaLnBrk="1" latinLnBrk="0" hangingPunct="1">
+      <a:defRPr sz="1200" kern="1200">
+        <a:solidFill>
+          <a:schemeClr val="tx1"/>
+        </a:solidFill>
+        <a:latin typeface="+mn-lt"/>
+        <a:ea typeface="+mn-ea"/>
+        <a:cs typeface="+mn-cs"/>
+      </a:defRPr>
+    </a:lvl9pPr>
+  </p:notesStyle>
+</p:notesMaster>
+</file>
+
+<file path=ppt/notesSlides/notesSlide1.xml><?xml version="1.0" encoding="utf-8"?>
+<p:notes xmlns:a="http://schemas.openxmlformats.org/drawingml/2006/main" xmlns:r="http://schemas.openxmlformats.org/officeDocument/2006/relationships" xmlns:p="http://schemas.openxmlformats.org/presentationml/2006/main">
+  <p:cSld>
+    <p:spTree>
+      <p:nvGrpSpPr>
+        <p:cNvPr id="1" name=""/>
+        <p:cNvGrpSpPr/>
+        <p:nvPr/>
+      </p:nvGrpSpPr>
+      <p:grpSpPr>
+        <a:xfrm>
+          <a:off x="0" y="0"/>
+          <a:ext cx="0" cy="0"/>
+          <a:chOff x="0" y="0"/>
+          <a:chExt cx="0" cy="0"/>
+        </a:xfrm>
+      </p:grpSpPr>
+      <p:sp>
+        <p:nvSpPr>
+          <p:cNvPr id="2" name="Slide Image Placeholder 1"/>
+          <p:cNvSpPr>
+            <a:spLocks noGrp="1" noRot="1" noChangeAspect="1"/>
+          </p:cNvSpPr>
+          <p:nvPr>
+            <p:ph type="sldImg"/>
+          </p:nvPr>
+        </p:nvSpPr>
+        <p:spPr/>
+      </p:sp>
+      <p:sp>
+        <p:nvSpPr>
+          <p:cNvPr id="3" name="Notes Placeholder 2"/>
+          <p:cNvSpPr>
+            <a:spLocks noGrp="1"/>
+          </p:cNvSpPr>
+          <p:nvPr>
+            <p:ph type="body" idx="1"/>
+          </p:nvPr>
+        </p:nvSpPr>
+        <p:spPr/>
+        <p:txBody>
+          <a:bodyPr/>
+          <a:lstStyle/>
+          <a:p>
+            <a:r>
+              <a:rPr lang="en-US" sz="1200" dirty="0"/>
+              <a:t>2020, HI 1.4m, NC 10.4m, SC 5.1m, FL 21.5m</a:t>
+            </a:r>
+            <a:endParaRPr lang="en-AE" sz="1200" dirty="0"/>
+          </a:p>
+          <a:p>
+            <a:endParaRPr lang="en-AE" dirty="0"/>
+          </a:p>
+        </p:txBody>
+      </p:sp>
+      <p:sp>
+        <p:nvSpPr>
+          <p:cNvPr id="4" name="Slide Number Placeholder 3"/>
+          <p:cNvSpPr>
+            <a:spLocks noGrp="1"/>
+          </p:cNvSpPr>
+          <p:nvPr>
+            <p:ph type="sldNum" sz="quarter" idx="5"/>
+          </p:nvPr>
+        </p:nvSpPr>
+        <p:spPr/>
+        <p:txBody>
+          <a:bodyPr/>
+          <a:lstStyle/>
+          <a:p>
+            <a:fld id="{7566C1FF-74EB-499E-BC09-3CB0C6C86336}" type="slidenum">
+              <a:rPr lang="en-AE" smtClean="0"/>
+              <a:t>3</a:t>
+            </a:fld>
+            <a:endParaRPr lang="en-AE"/>
+          </a:p>
+        </p:txBody>
+      </p:sp>
+    </p:spTree>
+    <p:extLst>
+      <p:ext uri="{BB962C8B-B14F-4D97-AF65-F5344CB8AC3E}">
+        <p14:creationId xmlns:p14="http://schemas.microsoft.com/office/powerpoint/2010/main" val="1070447632"/>
+      </p:ext>
+    </p:extLst>
+  </p:cSld>
+  <p:clrMapOvr>
+    <a:masterClrMapping/>
+  </p:clrMapOvr>
+</p:notes>
 </file>
 
 <file path=ppt/slideLayouts/slideLayout1.xml><?xml version="1.0" encoding="utf-8"?>
@@ -4371,10 +4815,10 @@
       </p:grpSpPr>
       <p:sp useBgFill="1">
         <p:nvSpPr>
-          <p:cNvPr id="9" name="Rectangle 8">
-            <a:extLst>
-              <a:ext uri="{FF2B5EF4-FFF2-40B4-BE49-F238E27FC236}">
-                <a16:creationId xmlns:a16="http://schemas.microsoft.com/office/drawing/2014/main" id="{9D3643A2-C7A3-4BF6-B486-4439025048B8}"/>
+          <p:cNvPr id="20" name="Rectangle 19">
+            <a:extLst>
+              <a:ext uri="{FF2B5EF4-FFF2-40B4-BE49-F238E27FC236}">
+                <a16:creationId xmlns:a16="http://schemas.microsoft.com/office/drawing/2014/main" id="{FFC321AD-2C92-446F-AF58-8CAA634BFD36}"/>
               </a:ext>
               <a:ext uri="{C183D7F6-B498-43B3-948B-1728B52AA6E4}">
                 <adec:decorative xmlns:adec="http://schemas.microsoft.com/office/drawing/2017/decorative" val="1"/>
@@ -4445,72 +4889,6 @@
           </a:p>
         </p:txBody>
       </p:sp>
-      <p:sp>
-        <p:nvSpPr>
-          <p:cNvPr id="11" name="Rectangle 10">
-            <a:extLst>
-              <a:ext uri="{FF2B5EF4-FFF2-40B4-BE49-F238E27FC236}">
-                <a16:creationId xmlns:a16="http://schemas.microsoft.com/office/drawing/2014/main" id="{79EF8FBA-A282-4B11-B85A-894F3CEFB546}"/>
-              </a:ext>
-              <a:ext uri="{C183D7F6-B498-43B3-948B-1728B52AA6E4}">
-                <adec:decorative xmlns:adec="http://schemas.microsoft.com/office/drawing/2017/decorative" val="1"/>
-              </a:ext>
-            </a:extLst>
-          </p:cNvPr>
-          <p:cNvSpPr>
-            <a:spLocks noGrp="1" noRot="1" noChangeAspect="1" noMove="1" noResize="1" noEditPoints="1" noAdjustHandles="1" noChangeArrowheads="1" noChangeShapeType="1" noTextEdit="1"/>
-          </p:cNvSpPr>
-          <p:nvPr>
-            <p:extLst>
-              <p:ext uri="{386F3935-93C4-4BCD-93E2-E3B085C9AB24}">
-                <p16:designElem xmlns:p16="http://schemas.microsoft.com/office/powerpoint/2015/main" val="1"/>
-              </p:ext>
-            </p:extLst>
-          </p:nvPr>
-        </p:nvSpPr>
-        <p:spPr>
-          <a:xfrm>
-            <a:off x="0" y="0"/>
-            <a:ext cx="12192000" cy="6858000"/>
-          </a:xfrm>
-          <a:prstGeom prst="rect">
-            <a:avLst/>
-          </a:prstGeom>
-          <a:solidFill>
-            <a:srgbClr val="000000"/>
-          </a:solidFill>
-          <a:ln w="12700" cap="flat" cmpd="sng" algn="ctr">
-            <a:noFill/>
-            <a:prstDash val="solid"/>
-            <a:miter lim="800000"/>
-          </a:ln>
-          <a:effectLst/>
-        </p:spPr>
-        <p:style>
-          <a:lnRef idx="2">
-            <a:schemeClr val="accent1">
-              <a:shade val="50000"/>
-            </a:schemeClr>
-          </a:lnRef>
-          <a:fillRef idx="1">
-            <a:schemeClr val="accent1"/>
-          </a:fillRef>
-          <a:effectRef idx="0">
-            <a:schemeClr val="accent1"/>
-          </a:effectRef>
-          <a:fontRef idx="minor">
-            <a:schemeClr val="lt1"/>
-          </a:fontRef>
-        </p:style>
-        <p:txBody>
-          <a:bodyPr rtlCol="0" anchor="ctr"/>
-          <a:lstStyle/>
-          <a:p>
-            <a:pPr algn="ctr"/>
-            <a:endParaRPr lang="en-US"/>
-          </a:p>
-        </p:txBody>
-      </p:sp>
       <p:pic>
         <p:nvPicPr>
           <p:cNvPr id="4" name="Picture 3" descr="Bubble sheet test paper and pencil">
@@ -4527,15 +4905,15 @@
         </p:nvPicPr>
         <p:blipFill>
           <a:blip r:embed="rId2">
-            <a:alphaModFix amt="50000"/>
+            <a:alphaModFix/>
           </a:blip>
-          <a:srcRect t="5252" b="8209"/>
+          <a:srcRect t="5296" b="8166"/>
           <a:stretch/>
         </p:blipFill>
         <p:spPr>
           <a:xfrm>
-            <a:off x="1" y="10"/>
-            <a:ext cx="12191999" cy="6857990"/>
+            <a:off x="20" y="10"/>
+            <a:ext cx="12191980" cy="6857989"/>
           </a:xfrm>
           <a:prstGeom prst="rect">
             <a:avLst/>
@@ -4544,100 +4922,10 @@
       </p:pic>
       <p:sp>
         <p:nvSpPr>
-          <p:cNvPr id="2" name="Title 1">
-            <a:extLst>
-              <a:ext uri="{FF2B5EF4-FFF2-40B4-BE49-F238E27FC236}">
-                <a16:creationId xmlns:a16="http://schemas.microsoft.com/office/drawing/2014/main" id="{5A7FBD5A-820E-AE06-0378-3625DE61F2BF}"/>
-              </a:ext>
-            </a:extLst>
-          </p:cNvPr>
-          <p:cNvSpPr>
-            <a:spLocks noGrp="1"/>
-          </p:cNvSpPr>
-          <p:nvPr>
-            <p:ph type="ctrTitle"/>
-          </p:nvPr>
-        </p:nvSpPr>
-        <p:spPr>
-          <a:xfrm>
-            <a:off x="800101" y="1417983"/>
-            <a:ext cx="6223552" cy="2902225"/>
-          </a:xfrm>
-        </p:spPr>
-        <p:txBody>
-          <a:bodyPr anchor="t">
-            <a:normAutofit/>
-          </a:bodyPr>
-          <a:lstStyle/>
-          <a:p>
-            <a:r>
-              <a:rPr lang="en-GB" b="1" i="0" dirty="0">
-                <a:solidFill>
-                  <a:srgbClr val="FFFFFF"/>
-                </a:solidFill>
-                <a:effectLst/>
-                <a:latin typeface="system-ui"/>
-              </a:rPr>
-              <a:t>Standardized Test Analysis</a:t>
-            </a:r>
-            <a:endParaRPr lang="en-AE" dirty="0">
-              <a:solidFill>
-                <a:srgbClr val="FFFFFF"/>
-              </a:solidFill>
-            </a:endParaRPr>
-          </a:p>
-        </p:txBody>
-      </p:sp>
-      <p:sp>
-        <p:nvSpPr>
-          <p:cNvPr id="3" name="Subtitle 2">
-            <a:extLst>
-              <a:ext uri="{FF2B5EF4-FFF2-40B4-BE49-F238E27FC236}">
-                <a16:creationId xmlns:a16="http://schemas.microsoft.com/office/drawing/2014/main" id="{B5EEC83D-C244-A78A-BB0C-122E4E84C217}"/>
-              </a:ext>
-            </a:extLst>
-          </p:cNvPr>
-          <p:cNvSpPr>
-            <a:spLocks noGrp="1"/>
-          </p:cNvSpPr>
-          <p:nvPr>
-            <p:ph type="subTitle" idx="1"/>
-          </p:nvPr>
-        </p:nvSpPr>
-        <p:spPr>
-          <a:xfrm>
-            <a:off x="800101" y="4681728"/>
-            <a:ext cx="4679674" cy="1452372"/>
-          </a:xfrm>
-        </p:spPr>
-        <p:txBody>
-          <a:bodyPr>
-            <a:normAutofit/>
-          </a:bodyPr>
-          <a:lstStyle/>
-          <a:p>
-            <a:r>
-              <a:rPr lang="en-US">
-                <a:solidFill>
-                  <a:srgbClr val="FFFFFF"/>
-                </a:solidFill>
-              </a:rPr>
-              <a:t>11 October 2024</a:t>
-            </a:r>
-            <a:endParaRPr lang="en-AE">
-              <a:solidFill>
-                <a:srgbClr val="FFFFFF"/>
-              </a:solidFill>
-            </a:endParaRPr>
-          </a:p>
-        </p:txBody>
-      </p:sp>
-      <p:sp>
-        <p:nvSpPr>
-          <p:cNvPr id="13" name="Rectangle 6">
-            <a:extLst>
-              <a:ext uri="{FF2B5EF4-FFF2-40B4-BE49-F238E27FC236}">
-                <a16:creationId xmlns:a16="http://schemas.microsoft.com/office/drawing/2014/main" id="{1E7A38B1-D1AF-46C0-A648-4F09838CBD8E}"/>
+          <p:cNvPr id="22" name="Freeform: Shape 21">
+            <a:extLst>
+              <a:ext uri="{FF2B5EF4-FFF2-40B4-BE49-F238E27FC236}">
+                <a16:creationId xmlns:a16="http://schemas.microsoft.com/office/drawing/2014/main" id="{50220E3B-B61B-7FE6-8157-FEE84BBD0819}"/>
               </a:ext>
               <a:ext uri="{C183D7F6-B498-43B3-948B-1728B52AA6E4}">
                 <adec:decorative xmlns:adec="http://schemas.microsoft.com/office/drawing/2017/decorative" val="1"/>
@@ -4656,31 +4944,21 @@
           </p:nvPr>
         </p:nvSpPr>
         <p:spPr>
-          <a:xfrm rot="10800000">
-            <a:off x="8446417" y="2940297"/>
-            <a:ext cx="3745582" cy="3917703"/>
+          <a:xfrm>
+            <a:off x="0" y="0"/>
+            <a:ext cx="6722853" cy="6858000"/>
           </a:xfrm>
           <a:custGeom>
             <a:avLst/>
             <a:gdLst>
-              <a:gd name="connsiteX0" fmla="*/ 0 w 1369143"/>
-              <a:gd name="connsiteY0" fmla="*/ 0 h 1229160"/>
-              <a:gd name="connsiteX1" fmla="*/ 1369143 w 1369143"/>
-              <a:gd name="connsiteY1" fmla="*/ 0 h 1229160"/>
-              <a:gd name="connsiteX2" fmla="*/ 1369143 w 1369143"/>
-              <a:gd name="connsiteY2" fmla="*/ 1229160 h 1229160"/>
-              <a:gd name="connsiteX3" fmla="*/ 0 w 1369143"/>
-              <a:gd name="connsiteY3" fmla="*/ 1229160 h 1229160"/>
-              <a:gd name="connsiteX4" fmla="*/ 0 w 1369143"/>
-              <a:gd name="connsiteY4" fmla="*/ 0 h 1229160"/>
-              <a:gd name="connsiteX0" fmla="*/ 0 w 1369143"/>
-              <a:gd name="connsiteY0" fmla="*/ 0 h 1229160"/>
-              <a:gd name="connsiteX1" fmla="*/ 1369143 w 1369143"/>
-              <a:gd name="connsiteY1" fmla="*/ 0 h 1229160"/>
-              <a:gd name="connsiteX2" fmla="*/ 0 w 1369143"/>
-              <a:gd name="connsiteY2" fmla="*/ 1229160 h 1229160"/>
-              <a:gd name="connsiteX3" fmla="*/ 0 w 1369143"/>
-              <a:gd name="connsiteY3" fmla="*/ 0 h 1229160"/>
+              <a:gd name="connsiteX0" fmla="*/ 2192785 w 2192785"/>
+              <a:gd name="connsiteY0" fmla="*/ 3807381 h 3807381"/>
+              <a:gd name="connsiteX1" fmla="*/ 0 w 2192785"/>
+              <a:gd name="connsiteY1" fmla="*/ 3807381 h 3807381"/>
+              <a:gd name="connsiteX2" fmla="*/ 0 w 2192785"/>
+              <a:gd name="connsiteY2" fmla="*/ 0 h 3807381"/>
+              <a:gd name="connsiteX3" fmla="*/ 2192785 w 2192785"/>
+              <a:gd name="connsiteY3" fmla="*/ 0 h 3807381"/>
             </a:gdLst>
             <a:ahLst/>
             <a:cxnLst>
@@ -4699,33 +4977,41 @@
             </a:cxnLst>
             <a:rect l="l" t="t" r="r" b="b"/>
             <a:pathLst>
-              <a:path w="1369143" h="1229160">
+              <a:path w="2192785" h="3807381">
                 <a:moveTo>
-                  <a:pt x="0" y="0"/>
+                  <a:pt x="2192785" y="3807381"/>
                 </a:moveTo>
                 <a:lnTo>
-                  <a:pt x="1369143" y="0"/>
-                </a:lnTo>
-                <a:lnTo>
-                  <a:pt x="0" y="1229160"/>
+                  <a:pt x="0" y="3807381"/>
                 </a:lnTo>
                 <a:lnTo>
                   <a:pt x="0" y="0"/>
+                </a:lnTo>
+                <a:lnTo>
+                  <a:pt x="2192785" y="0"/>
                 </a:lnTo>
                 <a:close/>
               </a:path>
             </a:pathLst>
           </a:custGeom>
-          <a:solidFill>
-            <a:schemeClr val="accent1">
-              <a:lumMod val="20000"/>
-              <a:lumOff val="80000"/>
-            </a:schemeClr>
-          </a:solidFill>
-          <a:ln w="12700">
+          <a:gradFill>
+            <a:gsLst>
+              <a:gs pos="0">
+                <a:srgbClr val="000000">
+                  <a:alpha val="0"/>
+                </a:srgbClr>
+              </a:gs>
+              <a:gs pos="95000">
+                <a:srgbClr val="000000">
+                  <a:alpha val="55000"/>
+                </a:srgbClr>
+              </a:gs>
+            </a:gsLst>
+            <a:lin ang="10800000" scaled="0"/>
+          </a:gradFill>
+          <a:ln>
             <a:noFill/>
           </a:ln>
-          <a:effectLst/>
         </p:spPr>
         <p:style>
           <a:lnRef idx="2">
@@ -4744,7 +5030,9 @@
           </a:fontRef>
         </p:style>
         <p:txBody>
-          <a:bodyPr rtlCol="0" anchor="ctr"/>
+          <a:bodyPr wrap="square" rtlCol="0" anchor="ctr">
+            <a:noAutofit/>
+          </a:bodyPr>
           <a:lstStyle/>
           <a:p>
             <a:pPr algn="ctr"/>
@@ -4754,10 +5042,87 @@
       </p:sp>
       <p:sp>
         <p:nvSpPr>
-          <p:cNvPr id="15" name="Freeform: Shape 14">
-            <a:extLst>
-              <a:ext uri="{FF2B5EF4-FFF2-40B4-BE49-F238E27FC236}">
-                <a16:creationId xmlns:a16="http://schemas.microsoft.com/office/drawing/2014/main" id="{042AC6AC-B644-4C7C-BEC7-E2B9E90FA03F}"/>
+          <p:cNvPr id="2" name="Title 1">
+            <a:extLst>
+              <a:ext uri="{FF2B5EF4-FFF2-40B4-BE49-F238E27FC236}">
+                <a16:creationId xmlns:a16="http://schemas.microsoft.com/office/drawing/2014/main" id="{5A7FBD5A-820E-AE06-0378-3625DE61F2BF}"/>
+              </a:ext>
+            </a:extLst>
+          </p:cNvPr>
+          <p:cNvSpPr>
+            <a:spLocks noGrp="1"/>
+          </p:cNvSpPr>
+          <p:nvPr>
+            <p:ph type="ctrTitle"/>
+          </p:nvPr>
+        </p:nvSpPr>
+        <p:spPr>
+          <a:xfrm>
+            <a:off x="807027" y="1261872"/>
+            <a:ext cx="5622528" cy="2852928"/>
+          </a:xfrm>
+        </p:spPr>
+        <p:txBody>
+          <a:bodyPr anchor="t">
+            <a:normAutofit/>
+          </a:bodyPr>
+          <a:lstStyle/>
+          <a:p>
+            <a:pPr>
+              <a:lnSpc>
+                <a:spcPct val="120000"/>
+              </a:lnSpc>
+            </a:pPr>
+            <a:r>
+              <a:rPr lang="en-GB" b="1" i="0" dirty="0">
+                <a:solidFill>
+                  <a:srgbClr val="FFFFFF"/>
+                </a:solidFill>
+                <a:effectLst/>
+                <a:latin typeface="system-ui"/>
+              </a:rPr>
+              <a:t>Standardized Test Analysis</a:t>
+            </a:r>
+            <a:br>
+              <a:rPr lang="en-GB" sz="2500" b="1" i="0" dirty="0">
+                <a:solidFill>
+                  <a:srgbClr val="FFFFFF"/>
+                </a:solidFill>
+                <a:effectLst/>
+                <a:latin typeface="system-ui"/>
+              </a:rPr>
+            </a:br>
+            <a:br>
+              <a:rPr lang="en-GB" sz="2500" b="1" dirty="0">
+                <a:solidFill>
+                  <a:srgbClr val="FFFFFF"/>
+                </a:solidFill>
+                <a:latin typeface="system-ui"/>
+              </a:rPr>
+            </a:br>
+            <a:r>
+              <a:rPr lang="en-GB" sz="1600" b="1" dirty="0">
+                <a:solidFill>
+                  <a:srgbClr val="FFFFFF"/>
+                </a:solidFill>
+                <a:latin typeface="system-ui"/>
+              </a:rPr>
+              <a:t>Where to establish a new learning center</a:t>
+            </a:r>
+            <a:endParaRPr lang="en-AE" sz="2500" dirty="0">
+              <a:solidFill>
+                <a:srgbClr val="FFFFFF"/>
+              </a:solidFill>
+            </a:endParaRPr>
+          </a:p>
+        </p:txBody>
+      </p:sp>
+      <p:sp>
+        <p:nvSpPr>
+          <p:cNvPr id="24" name="Freeform: Shape 23">
+            <a:extLst>
+              <a:ext uri="{FF2B5EF4-FFF2-40B4-BE49-F238E27FC236}">
+                <a16:creationId xmlns:a16="http://schemas.microsoft.com/office/drawing/2014/main" id="{2FA801D1-B067-4DAE-708F-7C47567C2C56}"/>
               </a:ext>
               <a:ext uri="{C183D7F6-B498-43B3-948B-1728B52AA6E4}">
                 <adec:decorative xmlns:adec="http://schemas.microsoft.com/office/drawing/2017/decorative" val="1"/>
@@ -4776,19 +5141,21 @@
           </p:nvPr>
         </p:nvSpPr>
         <p:spPr>
-          <a:xfrm>
-            <a:off x="8446417" y="2940297"/>
-            <a:ext cx="3745582" cy="3917703"/>
+          <a:xfrm rot="10800000">
+            <a:off x="9995139" y="0"/>
+            <a:ext cx="2196859" cy="6858000"/>
           </a:xfrm>
           <a:custGeom>
             <a:avLst/>
             <a:gdLst>
-              <a:gd name="connsiteX0" fmla="*/ 3745582 w 3745582"/>
-              <a:gd name="connsiteY0" fmla="*/ 0 h 3917703"/>
-              <a:gd name="connsiteX1" fmla="*/ 3745582 w 3745582"/>
-              <a:gd name="connsiteY1" fmla="*/ 3917703 h 3917703"/>
-              <a:gd name="connsiteX2" fmla="*/ 0 w 3745582"/>
-              <a:gd name="connsiteY2" fmla="*/ 3917703 h 3917703"/>
+              <a:gd name="connsiteX0" fmla="*/ 2192785 w 2192785"/>
+              <a:gd name="connsiteY0" fmla="*/ 3807381 h 3807381"/>
+              <a:gd name="connsiteX1" fmla="*/ 0 w 2192785"/>
+              <a:gd name="connsiteY1" fmla="*/ 3807381 h 3807381"/>
+              <a:gd name="connsiteX2" fmla="*/ 0 w 2192785"/>
+              <a:gd name="connsiteY2" fmla="*/ 0 h 3807381"/>
+              <a:gd name="connsiteX3" fmla="*/ 2192785 w 2192785"/>
+              <a:gd name="connsiteY3" fmla="*/ 0 h 3807381"/>
             </a:gdLst>
             <a:ahLst/>
             <a:cxnLst>
@@ -4801,24 +5168,107 @@
               <a:cxn ang="0">
                 <a:pos x="connsiteX2" y="connsiteY2"/>
               </a:cxn>
+              <a:cxn ang="0">
+                <a:pos x="connsiteX3" y="connsiteY3"/>
+              </a:cxn>
             </a:cxnLst>
             <a:rect l="l" t="t" r="r" b="b"/>
             <a:pathLst>
-              <a:path w="3745582" h="3917703">
+              <a:path w="2192785" h="3807381">
                 <a:moveTo>
-                  <a:pt x="3745582" y="0"/>
+                  <a:pt x="2192785" y="3807381"/>
                 </a:moveTo>
                 <a:lnTo>
-                  <a:pt x="3745582" y="3917703"/>
+                  <a:pt x="0" y="3807381"/>
                 </a:lnTo>
                 <a:lnTo>
-                  <a:pt x="0" y="3917703"/>
+                  <a:pt x="0" y="0"/>
+                </a:lnTo>
+                <a:lnTo>
+                  <a:pt x="2192785" y="0"/>
                 </a:lnTo>
                 <a:close/>
               </a:path>
             </a:pathLst>
           </a:custGeom>
-          <a:blipFill dpi="0" rotWithShape="0">
+          <a:gradFill>
+            <a:gsLst>
+              <a:gs pos="0">
+                <a:srgbClr val="000000">
+                  <a:alpha val="0"/>
+                </a:srgbClr>
+              </a:gs>
+              <a:gs pos="100000">
+                <a:srgbClr val="000000">
+                  <a:alpha val="31000"/>
+                </a:srgbClr>
+              </a:gs>
+            </a:gsLst>
+            <a:lin ang="10800000" scaled="0"/>
+          </a:gradFill>
+          <a:ln>
+            <a:noFill/>
+          </a:ln>
+        </p:spPr>
+        <p:style>
+          <a:lnRef idx="2">
+            <a:schemeClr val="accent1">
+              <a:shade val="50000"/>
+            </a:schemeClr>
+          </a:lnRef>
+          <a:fillRef idx="1">
+            <a:schemeClr val="accent1"/>
+          </a:fillRef>
+          <a:effectRef idx="0">
+            <a:schemeClr val="accent1"/>
+          </a:effectRef>
+          <a:fontRef idx="minor">
+            <a:schemeClr val="lt1"/>
+          </a:fontRef>
+        </p:style>
+        <p:txBody>
+          <a:bodyPr wrap="square" rtlCol="0" anchor="ctr">
+            <a:noAutofit/>
+          </a:bodyPr>
+          <a:lstStyle/>
+          <a:p>
+            <a:pPr algn="ctr"/>
+            <a:endParaRPr lang="en-US"/>
+          </a:p>
+        </p:txBody>
+      </p:sp>
+      <p:sp>
+        <p:nvSpPr>
+          <p:cNvPr id="26" name="Rectangle 25">
+            <a:extLst>
+              <a:ext uri="{FF2B5EF4-FFF2-40B4-BE49-F238E27FC236}">
+                <a16:creationId xmlns:a16="http://schemas.microsoft.com/office/drawing/2014/main" id="{2BF5D4DB-368A-4B23-81E4-E0454BAD8672}"/>
+              </a:ext>
+              <a:ext uri="{C183D7F6-B498-43B3-948B-1728B52AA6E4}">
+                <adec:decorative xmlns:adec="http://schemas.microsoft.com/office/drawing/2017/decorative" val="1"/>
+              </a:ext>
+            </a:extLst>
+          </p:cNvPr>
+          <p:cNvSpPr>
+            <a:spLocks noGrp="1" noRot="1" noChangeAspect="1" noMove="1" noResize="1" noEditPoints="1" noAdjustHandles="1" noChangeArrowheads="1" noChangeShapeType="1" noTextEdit="1"/>
+          </p:cNvSpPr>
+          <p:nvPr>
+            <p:extLst>
+              <p:ext uri="{386F3935-93C4-4BCD-93E2-E3B085C9AB24}">
+                <p16:designElem xmlns:p16="http://schemas.microsoft.com/office/powerpoint/2015/main" val="1"/>
+              </p:ext>
+            </p:extLst>
+          </p:nvPr>
+        </p:nvSpPr>
+        <p:spPr>
+          <a:xfrm rot="10800000">
+            <a:off x="11563125" y="3424422"/>
+            <a:ext cx="642729" cy="2930667"/>
+          </a:xfrm>
+          <a:prstGeom prst="rect">
+            <a:avLst/>
+          </a:prstGeom>
+          <a:blipFill dpi="0" rotWithShape="1">
             <a:blip r:embed="rId3">
               <a:alphaModFix amt="99000"/>
               <a:extLst>
@@ -4828,7 +5278,7 @@
               </a:extLst>
             </a:blip>
             <a:srcRect/>
-            <a:tile tx="0" ty="0" sx="40000" sy="40000" flip="none" algn="ctr"/>
+            <a:tile tx="0" ty="0" sx="6000" sy="6000" flip="none" algn="ctr"/>
           </a:blipFill>
           <a:ln>
             <a:noFill/>
@@ -4851,9 +5301,70 @@
           </a:fontRef>
         </p:style>
         <p:txBody>
-          <a:bodyPr wrap="square" rtlCol="0" anchor="ctr">
-            <a:noAutofit/>
-          </a:bodyPr>
+          <a:bodyPr rtlCol="0" anchor="ctr"/>
+          <a:lstStyle/>
+          <a:p>
+            <a:pPr algn="ctr"/>
+            <a:endParaRPr lang="en-US"/>
+          </a:p>
+        </p:txBody>
+      </p:sp>
+      <p:sp>
+        <p:nvSpPr>
+          <p:cNvPr id="28" name="Rectangle 27">
+            <a:extLst>
+              <a:ext uri="{FF2B5EF4-FFF2-40B4-BE49-F238E27FC236}">
+                <a16:creationId xmlns:a16="http://schemas.microsoft.com/office/drawing/2014/main" id="{F372D7B9-36D5-4C1F-B7C9-36717C28F150}"/>
+              </a:ext>
+              <a:ext uri="{C183D7F6-B498-43B3-948B-1728B52AA6E4}">
+                <adec:decorative xmlns:adec="http://schemas.microsoft.com/office/drawing/2017/decorative" val="1"/>
+              </a:ext>
+            </a:extLst>
+          </p:cNvPr>
+          <p:cNvSpPr>
+            <a:spLocks noGrp="1" noRot="1" noChangeAspect="1" noMove="1" noResize="1" noEditPoints="1" noAdjustHandles="1" noChangeArrowheads="1" noChangeShapeType="1" noTextEdit="1"/>
+          </p:cNvSpPr>
+          <p:nvPr>
+            <p:extLst>
+              <p:ext uri="{386F3935-93C4-4BCD-93E2-E3B085C9AB24}">
+                <p16:designElem xmlns:p16="http://schemas.microsoft.com/office/powerpoint/2015/main" val="1"/>
+              </p:ext>
+            </p:extLst>
+          </p:nvPr>
+        </p:nvSpPr>
+        <p:spPr>
+          <a:xfrm rot="10800000" flipV="1">
+            <a:off x="11985992" y="4836695"/>
+            <a:ext cx="206609" cy="2021305"/>
+          </a:xfrm>
+          <a:prstGeom prst="rect">
+            <a:avLst/>
+          </a:prstGeom>
+          <a:solidFill>
+            <a:schemeClr val="accent2"/>
+          </a:solidFill>
+          <a:ln>
+            <a:noFill/>
+          </a:ln>
+        </p:spPr>
+        <p:style>
+          <a:lnRef idx="2">
+            <a:schemeClr val="accent1">
+              <a:shade val="50000"/>
+            </a:schemeClr>
+          </a:lnRef>
+          <a:fillRef idx="1">
+            <a:schemeClr val="accent1"/>
+          </a:fillRef>
+          <a:effectRef idx="0">
+            <a:schemeClr val="accent1"/>
+          </a:effectRef>
+          <a:fontRef idx="minor">
+            <a:schemeClr val="lt1"/>
+          </a:fontRef>
+        </p:style>
+        <p:txBody>
+          <a:bodyPr rtlCol="0" anchor="ctr"/>
           <a:lstStyle/>
           <a:p>
             <a:pPr algn="ctr"/>
@@ -4888,8 +5399,8 @@
         </p:blipFill>
         <p:spPr bwMode="auto">
           <a:xfrm>
-            <a:off x="10469219" y="5181600"/>
-            <a:ext cx="1494799" cy="1494799"/>
+            <a:off x="10834979" y="5724762"/>
+            <a:ext cx="293269" cy="293269"/>
           </a:xfrm>
           <a:custGeom>
             <a:avLst/>
@@ -4948,13 +5459,13 @@
   <p:clrMapOvr>
     <a:masterClrMapping/>
   </p:clrMapOvr>
-  <mc:AlternateContent xmlns:mc="http://schemas.openxmlformats.org/markup-compatibility/2006">
-    <mc:Choice xmlns:p159="http://schemas.microsoft.com/office/powerpoint/2015/09/main" Requires="p159">
+  <mc:AlternateContent xmlns:mc="http://schemas.openxmlformats.org/markup-compatibility/2006" xmlns:p159="http://schemas.microsoft.com/office/powerpoint/2015/09/main">
+    <mc:Choice Requires="p159">
       <p:transition xmlns:p14="http://schemas.microsoft.com/office/powerpoint/2010/main" spd="slow" p14:dur="2000">
         <p159:morph option="byObject"/>
       </p:transition>
     </mc:Choice>
-    <mc:Fallback>
+    <mc:Fallback xmlns="">
       <p:transition spd="slow">
         <p:fade/>
       </p:transition>
@@ -5021,52 +5532,6 @@
                                   </p:childTnLst>
                                 </p:cTn>
                               </p:par>
-                              <p:par>
-                                <p:cTn id="8" presetID="10" presetClass="entr" presetSubtype="0" fill="hold" grpId="0" nodeType="withEffect">
-                                  <p:stCondLst>
-                                    <p:cond delay="1500"/>
-                                  </p:stCondLst>
-                                  <p:iterate>
-                                    <p:tmPct val="10000"/>
-                                  </p:iterate>
-                                  <p:childTnLst>
-                                    <p:set>
-                                      <p:cBhvr>
-                                        <p:cTn id="9" dur="1" fill="hold">
-                                          <p:stCondLst>
-                                            <p:cond delay="0"/>
-                                          </p:stCondLst>
-                                        </p:cTn>
-                                        <p:tgtEl>
-                                          <p:spTgt spid="3">
-                                            <p:txEl>
-                                              <p:pRg st="0" end="0"/>
-                                            </p:txEl>
-                                          </p:spTgt>
-                                        </p:tgtEl>
-                                        <p:attrNameLst>
-                                          <p:attrName>style.visibility</p:attrName>
-                                        </p:attrNameLst>
-                                      </p:cBhvr>
-                                      <p:to>
-                                        <p:strVal val="visible"/>
-                                      </p:to>
-                                    </p:set>
-                                    <p:animEffect transition="in" filter="fade">
-                                      <p:cBhvr>
-                                        <p:cTn id="10" dur="700"/>
-                                        <p:tgtEl>
-                                          <p:spTgt spid="3">
-                                            <p:txEl>
-                                              <p:pRg st="0" end="0"/>
-                                            </p:txEl>
-                                          </p:spTgt>
-                                        </p:tgtEl>
-                                      </p:cBhvr>
-                                    </p:animEffect>
-                                  </p:childTnLst>
-                                </p:cTn>
-                              </p:par>
                             </p:childTnLst>
                           </p:cTn>
                         </p:par>
@@ -5096,7 +5561,6 @@
     </p:tnLst>
     <p:bldLst>
       <p:bldP spid="2" grpId="0"/>
-      <p:bldP spid="3" grpId="0" build="p"/>
     </p:bldLst>
   </p:timing>
 </p:sld>
@@ -5367,7 +5831,7 @@
           <a:p>
             <a:r>
               <a:rPr lang="en-US" dirty="0"/>
-              <a:t>General Assembly Academy is planning to launch a new institution focused on standardized test preparation, specifically the ACT and SAT. The goal is to identify the best states to establish the institution and determine which subjects should be included in an intensive program.</a:t>
+              <a:t>General Assembly Academy is planning to launch a new learning center focused on standardized test preparation, specifically the ACT and SAT. The goal is to identify the best states to establish the learning center and determine which subjects should be included in an intensive program.</a:t>
             </a:r>
             <a:endParaRPr lang="en-AE" dirty="0"/>
           </a:p>
@@ -5711,13 +6175,13 @@
   <p:clrMapOvr>
     <a:masterClrMapping/>
   </p:clrMapOvr>
-  <mc:AlternateContent xmlns:mc="http://schemas.openxmlformats.org/markup-compatibility/2006">
-    <mc:Choice xmlns:p159="http://schemas.microsoft.com/office/powerpoint/2015/09/main" Requires="p159">
+  <mc:AlternateContent xmlns:mc="http://schemas.openxmlformats.org/markup-compatibility/2006" xmlns:p159="http://schemas.microsoft.com/office/powerpoint/2015/09/main">
+    <mc:Choice Requires="p159">
       <p:transition xmlns:p14="http://schemas.microsoft.com/office/powerpoint/2010/main" spd="slow" p14:dur="2000">
         <p159:morph option="byObject"/>
       </p:transition>
     </mc:Choice>
-    <mc:Fallback>
+    <mc:Fallback xmlns="">
       <p:transition spd="slow">
         <p:fade/>
       </p:transition>
@@ -6027,7 +6491,7 @@
           </p:nvPr>
         </p:nvPicPr>
         <p:blipFill>
-          <a:blip r:embed="rId2">
+          <a:blip r:embed="rId3">
             <a:extLst>
               <a:ext uri="{28A0092B-C50C-407E-A947-70E740481C1C}">
                 <a14:useLocalDpi xmlns:a14="http://schemas.microsoft.com/office/drawing/2010/main" val="0"/>
@@ -6358,10 +6822,10 @@
             </a:pathLst>
           </a:custGeom>
           <a:blipFill dpi="0" rotWithShape="1">
-            <a:blip r:embed="rId3">
+            <a:blip r:embed="rId4">
               <a:extLst>
                 <a:ext uri="{96DAC541-7B7A-43D3-8B79-37D633B846F1}">
-                  <asvg:svgBlip xmlns:asvg="http://schemas.microsoft.com/office/drawing/2016/SVG/main" r:embed="rId4"/>
+                  <asvg:svgBlip xmlns:asvg="http://schemas.microsoft.com/office/drawing/2016/SVG/main" r:embed="rId5"/>
                 </a:ext>
               </a:extLst>
             </a:blip>
@@ -6409,13 +6873,13 @@
   <p:clrMapOvr>
     <a:masterClrMapping/>
   </p:clrMapOvr>
-  <mc:AlternateContent xmlns:mc="http://schemas.openxmlformats.org/markup-compatibility/2006">
-    <mc:Choice xmlns:p159="http://schemas.microsoft.com/office/powerpoint/2015/09/main" Requires="p159">
+  <mc:AlternateContent xmlns:mc="http://schemas.openxmlformats.org/markup-compatibility/2006" xmlns:p159="http://schemas.microsoft.com/office/powerpoint/2015/09/main">
+    <mc:Choice Requires="p159">
       <p:transition xmlns:p14="http://schemas.microsoft.com/office/powerpoint/2010/main" spd="slow" p14:dur="2000">
         <p159:morph option="byObject"/>
       </p:transition>
     </mc:Choice>
-    <mc:Fallback>
+    <mc:Fallback xmlns="">
       <p:transition spd="slow">
         <p:fade/>
       </p:transition>
@@ -6756,13 +7220,13 @@
   <p:clrMapOvr>
     <a:masterClrMapping/>
   </p:clrMapOvr>
-  <mc:AlternateContent xmlns:mc="http://schemas.openxmlformats.org/markup-compatibility/2006">
-    <mc:Choice xmlns:p159="http://schemas.microsoft.com/office/powerpoint/2015/09/main" Requires="p159">
+  <mc:AlternateContent xmlns:mc="http://schemas.openxmlformats.org/markup-compatibility/2006" xmlns:p159="http://schemas.microsoft.com/office/powerpoint/2015/09/main">
+    <mc:Choice Requires="p159">
       <p:transition xmlns:p14="http://schemas.microsoft.com/office/powerpoint/2010/main" spd="slow" p14:dur="2000">
         <p159:morph option="byObject"/>
       </p:transition>
     </mc:Choice>
-    <mc:Fallback>
+    <mc:Fallback xmlns="">
       <p:transition spd="slow">
         <p:fade/>
       </p:transition>
@@ -7111,13 +7575,13 @@
   <p:clrMapOvr>
     <a:masterClrMapping/>
   </p:clrMapOvr>
-  <mc:AlternateContent xmlns:mc="http://schemas.openxmlformats.org/markup-compatibility/2006">
-    <mc:Choice xmlns:p159="http://schemas.microsoft.com/office/powerpoint/2015/09/main" Requires="p159">
+  <mc:AlternateContent xmlns:mc="http://schemas.openxmlformats.org/markup-compatibility/2006" xmlns:p159="http://schemas.microsoft.com/office/powerpoint/2015/09/main">
+    <mc:Choice Requires="p159">
       <p:transition xmlns:p14="http://schemas.microsoft.com/office/powerpoint/2010/main" spd="slow" p14:dur="2000">
         <p159:morph option="byObject"/>
       </p:transition>
     </mc:Choice>
-    <mc:Fallback>
+    <mc:Fallback xmlns="">
       <p:transition spd="slow">
         <p:fade/>
       </p:transition>
@@ -7195,7 +7659,7 @@
           <a:p>
             <a:r>
               <a:rPr lang="en-US" dirty="0"/>
-              <a:t>Suggest to establish the institute at Hawaii, Florida, North Carolina, or South Carolina</a:t>
+              <a:t>Suggest to establish the learning center at Hawaii, Florida, North Carolina, or South Carolina</a:t>
             </a:r>
           </a:p>
           <a:p>
@@ -7219,7 +7683,7 @@
             </a:pPr>
             <a:r>
               <a:rPr lang="en-US" dirty="0"/>
-              <a:t>	SAT – add Read &amp; Write intensive program</a:t>
+              <a:t>	SAT – add Read &amp; Write intensive programs</a:t>
             </a:r>
           </a:p>
           <a:p>
@@ -7237,13 +7701,13 @@
   <p:clrMapOvr>
     <a:masterClrMapping/>
   </p:clrMapOvr>
-  <mc:AlternateContent xmlns:mc="http://schemas.openxmlformats.org/markup-compatibility/2006">
-    <mc:Choice xmlns:p159="http://schemas.microsoft.com/office/powerpoint/2015/09/main" Requires="p159">
+  <mc:AlternateContent xmlns:mc="http://schemas.openxmlformats.org/markup-compatibility/2006" xmlns:p159="http://schemas.microsoft.com/office/powerpoint/2015/09/main">
+    <mc:Choice Requires="p159">
       <p:transition xmlns:p14="http://schemas.microsoft.com/office/powerpoint/2010/main" spd="slow" p14:dur="2000">
         <p159:morph option="byObject"/>
       </p:transition>
     </mc:Choice>
-    <mc:Fallback>
+    <mc:Fallback xmlns="">
       <p:transition spd="slow">
         <p:fade/>
       </p:transition>
@@ -7936,13 +8400,13 @@
   <p:clrMapOvr>
     <a:masterClrMapping/>
   </p:clrMapOvr>
-  <mc:AlternateContent xmlns:mc="http://schemas.openxmlformats.org/markup-compatibility/2006">
-    <mc:Choice xmlns:p159="http://schemas.microsoft.com/office/powerpoint/2015/09/main" Requires="p159">
+  <mc:AlternateContent xmlns:mc="http://schemas.openxmlformats.org/markup-compatibility/2006" xmlns:p159="http://schemas.microsoft.com/office/powerpoint/2015/09/main">
+    <mc:Choice Requires="p159">
       <p:transition xmlns:p14="http://schemas.microsoft.com/office/powerpoint/2010/main" spd="slow" p14:dur="2000">
         <p159:morph option="byObject"/>
       </p:transition>
     </mc:Choice>
-    <mc:Fallback>
+    <mc:Fallback xmlns="">
       <p:transition spd="slow">
         <p:fade/>
       </p:transition>
@@ -8242,4 +8706,319 @@
     </a:ext>
   </a:extLst>
 </a:theme>
+</file>
+
+<file path=ppt/theme/theme2.xml><?xml version="1.0" encoding="utf-8"?>
+<a:theme xmlns:a="http://schemas.openxmlformats.org/drawingml/2006/main" name="Office Theme">
+  <a:themeElements>
+    <a:clrScheme name="Office">
+      <a:dk1>
+        <a:sysClr val="windowText" lastClr="000000"/>
+      </a:dk1>
+      <a:lt1>
+        <a:sysClr val="window" lastClr="FFFFFF"/>
+      </a:lt1>
+      <a:dk2>
+        <a:srgbClr val="0E2841"/>
+      </a:dk2>
+      <a:lt2>
+        <a:srgbClr val="E8E8E8"/>
+      </a:lt2>
+      <a:accent1>
+        <a:srgbClr val="156082"/>
+      </a:accent1>
+      <a:accent2>
+        <a:srgbClr val="E97132"/>
+      </a:accent2>
+      <a:accent3>
+        <a:srgbClr val="196B24"/>
+      </a:accent3>
+      <a:accent4>
+        <a:srgbClr val="0F9ED5"/>
+      </a:accent4>
+      <a:accent5>
+        <a:srgbClr val="A02B93"/>
+      </a:accent5>
+      <a:accent6>
+        <a:srgbClr val="4EA72E"/>
+      </a:accent6>
+      <a:hlink>
+        <a:srgbClr val="467886"/>
+      </a:hlink>
+      <a:folHlink>
+        <a:srgbClr val="96607D"/>
+      </a:folHlink>
+    </a:clrScheme>
+    <a:fontScheme name="Office">
+      <a:majorFont>
+        <a:latin typeface="Aptos Display" panose="02110004020202020204"/>
+        <a:ea typeface=""/>
+        <a:cs typeface=""/>
+        <a:font script="Jpan" typeface="游ゴシック Light"/>
+        <a:font script="Hang" typeface="맑은 고딕"/>
+        <a:font script="Hans" typeface="等线 Light"/>
+        <a:font script="Hant" typeface="新細明體"/>
+        <a:font script="Arab" typeface="Times New Roman"/>
+        <a:font script="Hebr" typeface="Times New Roman"/>
+        <a:font script="Thai" typeface="Angsana New"/>
+        <a:font script="Ethi" typeface="Nyala"/>
+        <a:font script="Beng" typeface="Vrinda"/>
+        <a:font script="Gujr" typeface="Shruti"/>
+        <a:font script="Khmr" typeface="MoolBoran"/>
+        <a:font script="Knda" typeface="Tunga"/>
+        <a:font script="Guru" typeface="Raavi"/>
+        <a:font script="Cans" typeface="Euphemia"/>
+        <a:font script="Cher" typeface="Plantagenet Cherokee"/>
+        <a:font script="Yiii" typeface="Microsoft Yi Baiti"/>
+        <a:font script="Tibt" typeface="Microsoft Himalaya"/>
+        <a:font script="Thaa" typeface="MV Boli"/>
+        <a:font script="Deva" typeface="Mangal"/>
+        <a:font script="Telu" typeface="Gautami"/>
+        <a:font script="Taml" typeface="Latha"/>
+        <a:font script="Syrc" typeface="Estrangelo Edessa"/>
+        <a:font script="Orya" typeface="Kalinga"/>
+        <a:font script="Mlym" typeface="Kartika"/>
+        <a:font script="Laoo" typeface="DokChampa"/>
+        <a:font script="Sinh" typeface="Iskoola Pota"/>
+        <a:font script="Mong" typeface="Mongolian Baiti"/>
+        <a:font script="Viet" typeface="Times New Roman"/>
+        <a:font script="Uigh" typeface="Microsoft Uighur"/>
+        <a:font script="Geor" typeface="Sylfaen"/>
+        <a:font script="Armn" typeface="Arial"/>
+        <a:font script="Bugi" typeface="Leelawadee UI"/>
+        <a:font script="Bopo" typeface="Microsoft JhengHei"/>
+        <a:font script="Java" typeface="Javanese Text"/>
+        <a:font script="Lisu" typeface="Segoe UI"/>
+        <a:font script="Mymr" typeface="Myanmar Text"/>
+        <a:font script="Nkoo" typeface="Ebrima"/>
+        <a:font script="Olck" typeface="Nirmala UI"/>
+        <a:font script="Osma" typeface="Ebrima"/>
+        <a:font script="Phag" typeface="Phagspa"/>
+        <a:font script="Syrn" typeface="Estrangelo Edessa"/>
+        <a:font script="Syrj" typeface="Estrangelo Edessa"/>
+        <a:font script="Syre" typeface="Estrangelo Edessa"/>
+        <a:font script="Sora" typeface="Nirmala UI"/>
+        <a:font script="Tale" typeface="Microsoft Tai Le"/>
+        <a:font script="Talu" typeface="Microsoft New Tai Lue"/>
+        <a:font script="Tfng" typeface="Ebrima"/>
+      </a:majorFont>
+      <a:minorFont>
+        <a:latin typeface="Aptos" panose="02110004020202020204"/>
+        <a:ea typeface=""/>
+        <a:cs typeface=""/>
+        <a:font script="Jpan" typeface="游ゴシック"/>
+        <a:font script="Hang" typeface="맑은 고딕"/>
+        <a:font script="Hans" typeface="等线"/>
+        <a:font script="Hant" typeface="新細明體"/>
+        <a:font script="Arab" typeface="Arial"/>
+        <a:font script="Hebr" typeface="Arial"/>
+        <a:font script="Thai" typeface="Cordia New"/>
+        <a:font script="Ethi" typeface="Nyala"/>
+        <a:font script="Beng" typeface="Vrinda"/>
+        <a:font script="Gujr" typeface="Shruti"/>
+        <a:font script="Khmr" typeface="DaunPenh"/>
+        <a:font script="Knda" typeface="Tunga"/>
+        <a:font script="Guru" typeface="Raavi"/>
+        <a:font script="Cans" typeface="Euphemia"/>
+        <a:font script="Cher" typeface="Plantagenet Cherokee"/>
+        <a:font script="Yiii" typeface="Microsoft Yi Baiti"/>
+        <a:font script="Tibt" typeface="Microsoft Himalaya"/>
+        <a:font script="Thaa" typeface="MV Boli"/>
+        <a:font script="Deva" typeface="Mangal"/>
+        <a:font script="Telu" typeface="Gautami"/>
+        <a:font script="Taml" typeface="Latha"/>
+        <a:font script="Syrc" typeface="Estrangelo Edessa"/>
+        <a:font script="Orya" typeface="Kalinga"/>
+        <a:font script="Mlym" typeface="Kartika"/>
+        <a:font script="Laoo" typeface="DokChampa"/>
+        <a:font script="Sinh" typeface="Iskoola Pota"/>
+        <a:font script="Mong" typeface="Mongolian Baiti"/>
+        <a:font script="Viet" typeface="Arial"/>
+        <a:font script="Uigh" typeface="Microsoft Uighur"/>
+        <a:font script="Geor" typeface="Sylfaen"/>
+        <a:font script="Armn" typeface="Arial"/>
+        <a:font script="Bugi" typeface="Leelawadee UI"/>
+        <a:font script="Bopo" typeface="Microsoft JhengHei"/>
+        <a:font script="Java" typeface="Javanese Text"/>
+        <a:font script="Lisu" typeface="Segoe UI"/>
+        <a:font script="Mymr" typeface="Myanmar Text"/>
+        <a:font script="Nkoo" typeface="Ebrima"/>
+        <a:font script="Olck" typeface="Nirmala UI"/>
+        <a:font script="Osma" typeface="Ebrima"/>
+        <a:font script="Phag" typeface="Phagspa"/>
+        <a:font script="Syrn" typeface="Estrangelo Edessa"/>
+        <a:font script="Syrj" typeface="Estrangelo Edessa"/>
+        <a:font script="Syre" typeface="Estrangelo Edessa"/>
+        <a:font script="Sora" typeface="Nirmala UI"/>
+        <a:font script="Tale" typeface="Microsoft Tai Le"/>
+        <a:font script="Talu" typeface="Microsoft New Tai Lue"/>
+        <a:font script="Tfng" typeface="Ebrima"/>
+      </a:minorFont>
+    </a:fontScheme>
+    <a:fmtScheme name="Office">
+      <a:fillStyleLst>
+        <a:solidFill>
+          <a:schemeClr val="phClr"/>
+        </a:solidFill>
+        <a:gradFill rotWithShape="1">
+          <a:gsLst>
+            <a:gs pos="0">
+              <a:schemeClr val="phClr">
+                <a:lumMod val="110000"/>
+                <a:satMod val="105000"/>
+                <a:tint val="67000"/>
+              </a:schemeClr>
+            </a:gs>
+            <a:gs pos="50000">
+              <a:schemeClr val="phClr">
+                <a:lumMod val="105000"/>
+                <a:satMod val="103000"/>
+                <a:tint val="73000"/>
+              </a:schemeClr>
+            </a:gs>
+            <a:gs pos="100000">
+              <a:schemeClr val="phClr">
+                <a:lumMod val="105000"/>
+                <a:satMod val="109000"/>
+                <a:tint val="81000"/>
+              </a:schemeClr>
+            </a:gs>
+          </a:gsLst>
+          <a:lin ang="5400000" scaled="0"/>
+        </a:gradFill>
+        <a:gradFill rotWithShape="1">
+          <a:gsLst>
+            <a:gs pos="0">
+              <a:schemeClr val="phClr">
+                <a:satMod val="103000"/>
+                <a:lumMod val="102000"/>
+                <a:tint val="94000"/>
+              </a:schemeClr>
+            </a:gs>
+            <a:gs pos="50000">
+              <a:schemeClr val="phClr">
+                <a:satMod val="110000"/>
+                <a:lumMod val="100000"/>
+                <a:shade val="100000"/>
+              </a:schemeClr>
+            </a:gs>
+            <a:gs pos="100000">
+              <a:schemeClr val="phClr">
+                <a:lumMod val="99000"/>
+                <a:satMod val="120000"/>
+                <a:shade val="78000"/>
+              </a:schemeClr>
+            </a:gs>
+          </a:gsLst>
+          <a:lin ang="5400000" scaled="0"/>
+        </a:gradFill>
+      </a:fillStyleLst>
+      <a:lnStyleLst>
+        <a:ln w="12700" cap="flat" cmpd="sng" algn="ctr">
+          <a:solidFill>
+            <a:schemeClr val="phClr"/>
+          </a:solidFill>
+          <a:prstDash val="solid"/>
+          <a:miter lim="800000"/>
+        </a:ln>
+        <a:ln w="19050" cap="flat" cmpd="sng" algn="ctr">
+          <a:solidFill>
+            <a:schemeClr val="phClr"/>
+          </a:solidFill>
+          <a:prstDash val="solid"/>
+          <a:miter lim="800000"/>
+        </a:ln>
+        <a:ln w="25400" cap="flat" cmpd="sng" algn="ctr">
+          <a:solidFill>
+            <a:schemeClr val="phClr"/>
+          </a:solidFill>
+          <a:prstDash val="solid"/>
+          <a:miter lim="800000"/>
+        </a:ln>
+      </a:lnStyleLst>
+      <a:effectStyleLst>
+        <a:effectStyle>
+          <a:effectLst/>
+        </a:effectStyle>
+        <a:effectStyle>
+          <a:effectLst/>
+        </a:effectStyle>
+        <a:effectStyle>
+          <a:effectLst>
+            <a:outerShdw blurRad="57150" dist="19050" dir="5400000" algn="ctr" rotWithShape="0">
+              <a:srgbClr val="000000">
+                <a:alpha val="63000"/>
+              </a:srgbClr>
+            </a:outerShdw>
+          </a:effectLst>
+        </a:effectStyle>
+      </a:effectStyleLst>
+      <a:bgFillStyleLst>
+        <a:solidFill>
+          <a:schemeClr val="phClr"/>
+        </a:solidFill>
+        <a:solidFill>
+          <a:schemeClr val="phClr">
+            <a:tint val="95000"/>
+            <a:satMod val="170000"/>
+          </a:schemeClr>
+        </a:solidFill>
+        <a:gradFill rotWithShape="1">
+          <a:gsLst>
+            <a:gs pos="0">
+              <a:schemeClr val="phClr">
+                <a:tint val="93000"/>
+                <a:satMod val="150000"/>
+                <a:shade val="98000"/>
+                <a:lumMod val="102000"/>
+              </a:schemeClr>
+            </a:gs>
+            <a:gs pos="50000">
+              <a:schemeClr val="phClr">
+                <a:tint val="98000"/>
+                <a:satMod val="130000"/>
+                <a:shade val="90000"/>
+                <a:lumMod val="103000"/>
+              </a:schemeClr>
+            </a:gs>
+            <a:gs pos="100000">
+              <a:schemeClr val="phClr">
+                <a:shade val="63000"/>
+                <a:satMod val="120000"/>
+              </a:schemeClr>
+            </a:gs>
+          </a:gsLst>
+          <a:lin ang="5400000" scaled="0"/>
+        </a:gradFill>
+      </a:bgFillStyleLst>
+    </a:fmtScheme>
+  </a:themeElements>
+  <a:objectDefaults>
+    <a:lnDef>
+      <a:spPr/>
+      <a:bodyPr/>
+      <a:lstStyle/>
+      <a:style>
+        <a:lnRef idx="2">
+          <a:schemeClr val="accent1"/>
+        </a:lnRef>
+        <a:fillRef idx="0">
+          <a:schemeClr val="accent1"/>
+        </a:fillRef>
+        <a:effectRef idx="1">
+          <a:schemeClr val="accent1"/>
+        </a:effectRef>
+        <a:fontRef idx="minor">
+          <a:schemeClr val="tx1"/>
+        </a:fontRef>
+      </a:style>
+    </a:lnDef>
+  </a:objectDefaults>
+  <a:extraClrSchemeLst/>
+  <a:extLst>
+    <a:ext uri="{05A4C25C-085E-4340-85A3-A5531E510DB2}">
+      <thm15:themeFamily xmlns:thm15="http://schemas.microsoft.com/office/thememl/2012/main" name="Office Theme" id="{2E142A2C-CD16-42D6-873A-C26D2A0506FA}" vid="{1BDDFF52-6CD6-40A5-AB3C-68EB2F1E4D0A}"/>
+    </a:ext>
+  </a:extLst>
+</a:theme>
 </file>
</xml_diff>